<commit_message>
nuevos ejercicios en 396
</commit_message>
<xml_diff>
--- a/curso_python_codigo_369/369_clases.PPTX
+++ b/curso_python_codigo_369/369_clases.PPTX
@@ -105,6 +105,11 @@
       </a:defRPr>
     </a:lvl9pPr>
   </p:defaultTextStyle>
+  <p:extLst>
+    <p:ext uri="{EFAFB233-063F-42B5-8137-9DF3F51BA10A}">
+      <p15:sldGuideLst xmlns:p15="http://schemas.microsoft.com/office/powerpoint/2012/main"/>
+    </p:ext>
+  </p:extLst>
 </p:presentation>
 </file>
 
@@ -1319,7 +1324,7 @@
           <a:p>
             <a:fld id="{D15AE765-5ECA-4C6C-A94D-BF7758BAA011}" type="datetimeFigureOut">
               <a:rPr lang="en-US" smtClean="0"/>
-              <a:t>11/19/2024</a:t>
+              <a:t>11/20/2024</a:t>
             </a:fld>
             <a:endParaRPr lang="en-US"/>
           </a:p>
@@ -1557,7 +1562,7 @@
           <a:p>
             <a:fld id="{D15AE765-5ECA-4C6C-A94D-BF7758BAA011}" type="datetimeFigureOut">
               <a:rPr lang="en-US" smtClean="0"/>
-              <a:t>11/19/2024</a:t>
+              <a:t>11/20/2024</a:t>
             </a:fld>
             <a:endParaRPr lang="en-US"/>
           </a:p>
@@ -1737,7 +1742,7 @@
           <a:p>
             <a:fld id="{D15AE765-5ECA-4C6C-A94D-BF7758BAA011}" type="datetimeFigureOut">
               <a:rPr lang="en-US" smtClean="0"/>
-              <a:t>11/19/2024</a:t>
+              <a:t>11/20/2024</a:t>
             </a:fld>
             <a:endParaRPr lang="en-US"/>
           </a:p>
@@ -1907,7 +1912,7 @@
           <a:p>
             <a:fld id="{D15AE765-5ECA-4C6C-A94D-BF7758BAA011}" type="datetimeFigureOut">
               <a:rPr lang="en-US" smtClean="0"/>
-              <a:t>11/19/2024</a:t>
+              <a:t>11/20/2024</a:t>
             </a:fld>
             <a:endParaRPr lang="en-US"/>
           </a:p>
@@ -2183,7 +2188,7 @@
           <a:p>
             <a:fld id="{D15AE765-5ECA-4C6C-A94D-BF7758BAA011}" type="datetimeFigureOut">
               <a:rPr lang="en-US" smtClean="0"/>
-              <a:t>11/19/2024</a:t>
+              <a:t>11/20/2024</a:t>
             </a:fld>
             <a:endParaRPr lang="en-US"/>
           </a:p>
@@ -3384,7 +3389,7 @@
           <a:p>
             <a:fld id="{D15AE765-5ECA-4C6C-A94D-BF7758BAA011}" type="datetimeFigureOut">
               <a:rPr lang="en-US" smtClean="0"/>
-              <a:t>11/19/2024</a:t>
+              <a:t>11/20/2024</a:t>
             </a:fld>
             <a:endParaRPr lang="en-US"/>
           </a:p>
@@ -3774,7 +3779,7 @@
           <a:p>
             <a:fld id="{D15AE765-5ECA-4C6C-A94D-BF7758BAA011}" type="datetimeFigureOut">
               <a:rPr lang="en-US" smtClean="0"/>
-              <a:t>11/19/2024</a:t>
+              <a:t>11/20/2024</a:t>
             </a:fld>
             <a:endParaRPr lang="en-US"/>
           </a:p>
@@ -3897,7 +3902,7 @@
           <a:p>
             <a:fld id="{D15AE765-5ECA-4C6C-A94D-BF7758BAA011}" type="datetimeFigureOut">
               <a:rPr lang="en-US" smtClean="0"/>
-              <a:t>11/19/2024</a:t>
+              <a:t>11/20/2024</a:t>
             </a:fld>
             <a:endParaRPr lang="en-US"/>
           </a:p>
@@ -3992,7 +3997,7 @@
           <a:p>
             <a:fld id="{D15AE765-5ECA-4C6C-A94D-BF7758BAA011}" type="datetimeFigureOut">
               <a:rPr lang="en-US" smtClean="0"/>
-              <a:t>11/19/2024</a:t>
+              <a:t>11/20/2024</a:t>
             </a:fld>
             <a:endParaRPr lang="en-US"/>
           </a:p>
@@ -4755,7 +4760,7 @@
           <a:p>
             <a:fld id="{D15AE765-5ECA-4C6C-A94D-BF7758BAA011}" type="datetimeFigureOut">
               <a:rPr lang="en-US" smtClean="0"/>
-              <a:t>11/19/2024</a:t>
+              <a:t>11/20/2024</a:t>
             </a:fld>
             <a:endParaRPr lang="en-US"/>
           </a:p>
@@ -5595,7 +5600,7 @@
           <a:p>
             <a:fld id="{D15AE765-5ECA-4C6C-A94D-BF7758BAA011}" type="datetimeFigureOut">
               <a:rPr lang="en-US" smtClean="0"/>
-              <a:t>11/19/2024</a:t>
+              <a:t>11/20/2024</a:t>
             </a:fld>
             <a:endParaRPr lang="en-US"/>
           </a:p>
@@ -5822,7 +5827,7 @@
           <a:p>
             <a:fld id="{D15AE765-5ECA-4C6C-A94D-BF7758BAA011}" type="datetimeFigureOut">
               <a:rPr lang="en-US" smtClean="0"/>
-              <a:t>11/19/2024</a:t>
+              <a:t>11/20/2024</a:t>
             </a:fld>
             <a:endParaRPr lang="en-US"/>
           </a:p>

</xml_diff>